<commit_message>
Continua depuración: problema de registros
Se agrego un primer esqueleto para empleo de share memory
</commit_message>
<xml_diff>
--- a/docs/ModeloCUDA.pptx
+++ b/docs/ModeloCUDA.pptx
@@ -9,7 +9,9 @@
     <p:sldId id="257" r:id="rId3"/>
     <p:sldId id="258" r:id="rId4"/>
     <p:sldId id="260" r:id="rId5"/>
-    <p:sldId id="259" r:id="rId6"/>
+    <p:sldId id="261" r:id="rId6"/>
+    <p:sldId id="262" r:id="rId7"/>
+    <p:sldId id="259" r:id="rId8"/>
   </p:sldIdLst>
   <p:sldSz cx="9144000" cy="5143500" type="screen16x9"/>
   <p:notesSz cx="6858000" cy="9144000"/>
@@ -292,7 +294,7 @@
           <a:p>
             <a:fld id="{8B1ED8BD-6781-8745-973E-8C949FE6FDC7}" type="datetimeFigureOut">
               <a:rPr lang="es-ES" smtClean="0"/>
-              <a:t>31/08/14</a:t>
+              <a:t>13/09/14</a:t>
             </a:fld>
             <a:endParaRPr lang="es-ES"/>
           </a:p>
@@ -462,7 +464,7 @@
           <a:p>
             <a:fld id="{8B1ED8BD-6781-8745-973E-8C949FE6FDC7}" type="datetimeFigureOut">
               <a:rPr lang="es-ES" smtClean="0"/>
-              <a:t>31/08/14</a:t>
+              <a:t>13/09/14</a:t>
             </a:fld>
             <a:endParaRPr lang="es-ES"/>
           </a:p>
@@ -642,7 +644,7 @@
           <a:p>
             <a:fld id="{8B1ED8BD-6781-8745-973E-8C949FE6FDC7}" type="datetimeFigureOut">
               <a:rPr lang="es-ES" smtClean="0"/>
-              <a:t>31/08/14</a:t>
+              <a:t>13/09/14</a:t>
             </a:fld>
             <a:endParaRPr lang="es-ES"/>
           </a:p>
@@ -812,7 +814,7 @@
           <a:p>
             <a:fld id="{8B1ED8BD-6781-8745-973E-8C949FE6FDC7}" type="datetimeFigureOut">
               <a:rPr lang="es-ES" smtClean="0"/>
-              <a:t>31/08/14</a:t>
+              <a:t>13/09/14</a:t>
             </a:fld>
             <a:endParaRPr lang="es-ES"/>
           </a:p>
@@ -1058,7 +1060,7 @@
           <a:p>
             <a:fld id="{8B1ED8BD-6781-8745-973E-8C949FE6FDC7}" type="datetimeFigureOut">
               <a:rPr lang="es-ES" smtClean="0"/>
-              <a:t>31/08/14</a:t>
+              <a:t>13/09/14</a:t>
             </a:fld>
             <a:endParaRPr lang="es-ES"/>
           </a:p>
@@ -1346,7 +1348,7 @@
           <a:p>
             <a:fld id="{8B1ED8BD-6781-8745-973E-8C949FE6FDC7}" type="datetimeFigureOut">
               <a:rPr lang="es-ES" smtClean="0"/>
-              <a:t>31/08/14</a:t>
+              <a:t>13/09/14</a:t>
             </a:fld>
             <a:endParaRPr lang="es-ES"/>
           </a:p>
@@ -1768,7 +1770,7 @@
           <a:p>
             <a:fld id="{8B1ED8BD-6781-8745-973E-8C949FE6FDC7}" type="datetimeFigureOut">
               <a:rPr lang="es-ES" smtClean="0"/>
-              <a:t>31/08/14</a:t>
+              <a:t>13/09/14</a:t>
             </a:fld>
             <a:endParaRPr lang="es-ES"/>
           </a:p>
@@ -1886,7 +1888,7 @@
           <a:p>
             <a:fld id="{8B1ED8BD-6781-8745-973E-8C949FE6FDC7}" type="datetimeFigureOut">
               <a:rPr lang="es-ES" smtClean="0"/>
-              <a:t>31/08/14</a:t>
+              <a:t>13/09/14</a:t>
             </a:fld>
             <a:endParaRPr lang="es-ES"/>
           </a:p>
@@ -1981,7 +1983,7 @@
           <a:p>
             <a:fld id="{8B1ED8BD-6781-8745-973E-8C949FE6FDC7}" type="datetimeFigureOut">
               <a:rPr lang="es-ES" smtClean="0"/>
-              <a:t>31/08/14</a:t>
+              <a:t>13/09/14</a:t>
             </a:fld>
             <a:endParaRPr lang="es-ES"/>
           </a:p>
@@ -2258,7 +2260,7 @@
           <a:p>
             <a:fld id="{8B1ED8BD-6781-8745-973E-8C949FE6FDC7}" type="datetimeFigureOut">
               <a:rPr lang="es-ES" smtClean="0"/>
-              <a:t>31/08/14</a:t>
+              <a:t>13/09/14</a:t>
             </a:fld>
             <a:endParaRPr lang="es-ES"/>
           </a:p>
@@ -2511,7 +2513,7 @@
           <a:p>
             <a:fld id="{8B1ED8BD-6781-8745-973E-8C949FE6FDC7}" type="datetimeFigureOut">
               <a:rPr lang="es-ES" smtClean="0"/>
-              <a:t>31/08/14</a:t>
+              <a:t>13/09/14</a:t>
             </a:fld>
             <a:endParaRPr lang="es-ES"/>
           </a:p>
@@ -2724,7 +2726,7 @@
           <a:p>
             <a:fld id="{8B1ED8BD-6781-8745-973E-8C949FE6FDC7}" type="datetimeFigureOut">
               <a:rPr lang="es-ES" smtClean="0"/>
-              <a:t>31/08/14</a:t>
+              <a:t>13/09/14</a:t>
             </a:fld>
             <a:endParaRPr lang="es-ES"/>
           </a:p>
@@ -4416,11 +4418,7 @@
             </a:r>
             <a:r>
               <a:rPr lang="es-ES" smtClean="0"/>
-              <a:t>sin </a:t>
-            </a:r>
-            <a:r>
-              <a:rPr lang="es-ES" smtClean="0"/>
-              <a:t>ordenación II</a:t>
+              <a:t>sin ordenación II</a:t>
             </a:r>
             <a:endParaRPr lang="es-ES" dirty="0"/>
           </a:p>
@@ -4956,6 +4954,88 @@
           <a:ln w="12700">
             <a:solidFill>
               <a:srgbClr val="FF0000"/>
+            </a:solidFill>
+            <a:prstDash val="sysDash"/>
+            <a:tailEnd type="triangle"/>
+          </a:ln>
+          <a:effectLst/>
+        </p:spPr>
+        <p:style>
+          <a:lnRef idx="2">
+            <a:schemeClr val="accent1"/>
+          </a:lnRef>
+          <a:fillRef idx="0">
+            <a:schemeClr val="accent1"/>
+          </a:fillRef>
+          <a:effectRef idx="1">
+            <a:schemeClr val="accent1"/>
+          </a:effectRef>
+          <a:fontRef idx="minor">
+            <a:schemeClr val="tx1"/>
+          </a:fontRef>
+        </p:style>
+      </p:cxnSp>
+      <p:cxnSp>
+        <p:nvCxnSpPr>
+          <p:cNvPr id="23" name="Conector recto de flecha 22"/>
+          <p:cNvCxnSpPr/>
+          <p:nvPr/>
+        </p:nvCxnSpPr>
+        <p:spPr>
+          <a:xfrm flipH="1">
+            <a:off x="2156940" y="1572054"/>
+            <a:ext cx="2402183" cy="1057189"/>
+          </a:xfrm>
+          <a:prstGeom prst="straightConnector1">
+            <a:avLst/>
+          </a:prstGeom>
+          <a:ln w="12700">
+            <a:solidFill>
+              <a:schemeClr val="tx1">
+                <a:lumMod val="65000"/>
+                <a:lumOff val="35000"/>
+              </a:schemeClr>
+            </a:solidFill>
+            <a:prstDash val="sysDash"/>
+            <a:tailEnd type="triangle"/>
+          </a:ln>
+          <a:effectLst/>
+        </p:spPr>
+        <p:style>
+          <a:lnRef idx="2">
+            <a:schemeClr val="accent1"/>
+          </a:lnRef>
+          <a:fillRef idx="0">
+            <a:schemeClr val="accent1"/>
+          </a:fillRef>
+          <a:effectRef idx="1">
+            <a:schemeClr val="accent1"/>
+          </a:effectRef>
+          <a:fontRef idx="minor">
+            <a:schemeClr val="tx1"/>
+          </a:fontRef>
+        </p:style>
+      </p:cxnSp>
+      <p:cxnSp>
+        <p:nvCxnSpPr>
+          <p:cNvPr id="26" name="Conector recto de flecha 25"/>
+          <p:cNvCxnSpPr/>
+          <p:nvPr/>
+        </p:nvCxnSpPr>
+        <p:spPr>
+          <a:xfrm>
+            <a:off x="2156940" y="2629243"/>
+            <a:ext cx="2347784" cy="1110738"/>
+          </a:xfrm>
+          <a:prstGeom prst="straightConnector1">
+            <a:avLst/>
+          </a:prstGeom>
+          <a:ln w="12700">
+            <a:solidFill>
+              <a:schemeClr val="tx1">
+                <a:lumMod val="65000"/>
+                <a:lumOff val="35000"/>
+              </a:schemeClr>
             </a:solidFill>
             <a:prstDash val="sysDash"/>
             <a:tailEnd type="triangle"/>
@@ -4991,6 +5071,1284 @@
 </file>
 
 <file path=ppt/slides/slide5.xml><?xml version="1.0" encoding="utf-8"?>
+<p:sld xmlns:a="http://schemas.openxmlformats.org/drawingml/2006/main" xmlns:r="http://schemas.openxmlformats.org/officeDocument/2006/relationships" xmlns:p="http://schemas.openxmlformats.org/presentationml/2006/main">
+  <p:cSld>
+    <p:spTree>
+      <p:nvGrpSpPr>
+        <p:cNvPr id="1" name=""/>
+        <p:cNvGrpSpPr/>
+        <p:nvPr/>
+      </p:nvGrpSpPr>
+      <p:grpSpPr>
+        <a:xfrm>
+          <a:off x="0" y="0"/>
+          <a:ext cx="0" cy="0"/>
+          <a:chOff x="0" y="0"/>
+          <a:chExt cx="0" cy="0"/>
+        </a:xfrm>
+      </p:grpSpPr>
+      <p:sp>
+        <p:nvSpPr>
+          <p:cNvPr id="2" name="Título 1"/>
+          <p:cNvSpPr>
+            <a:spLocks noGrp="1"/>
+          </p:cNvSpPr>
+          <p:nvPr>
+            <p:ph type="title"/>
+          </p:nvPr>
+        </p:nvSpPr>
+        <p:spPr/>
+        <p:txBody>
+          <a:bodyPr/>
+          <a:lstStyle/>
+          <a:p>
+            <a:pPr algn="l"/>
+            <a:r>
+              <a:rPr lang="es-ES" dirty="0" err="1" smtClean="0"/>
+              <a:t>Shared</a:t>
+            </a:r>
+            <a:r>
+              <a:rPr lang="es-ES" dirty="0" smtClean="0"/>
+              <a:t> </a:t>
+            </a:r>
+            <a:r>
+              <a:rPr lang="es-ES" dirty="0" err="1" smtClean="0"/>
+              <a:t>Memory</a:t>
+            </a:r>
+            <a:endParaRPr lang="es-ES" dirty="0"/>
+          </a:p>
+        </p:txBody>
+      </p:sp>
+      <p:cxnSp>
+        <p:nvCxnSpPr>
+          <p:cNvPr id="5" name="Conector recto 4"/>
+          <p:cNvCxnSpPr/>
+          <p:nvPr/>
+        </p:nvCxnSpPr>
+        <p:spPr>
+          <a:xfrm flipV="1">
+            <a:off x="1461695" y="1572054"/>
+            <a:ext cx="6260757" cy="6865"/>
+          </a:xfrm>
+          <a:prstGeom prst="line">
+            <a:avLst/>
+          </a:prstGeom>
+          <a:effectLst/>
+        </p:spPr>
+        <p:style>
+          <a:lnRef idx="2">
+            <a:schemeClr val="accent1"/>
+          </a:lnRef>
+          <a:fillRef idx="0">
+            <a:schemeClr val="accent1"/>
+          </a:fillRef>
+          <a:effectRef idx="1">
+            <a:schemeClr val="accent1"/>
+          </a:effectRef>
+          <a:fontRef idx="minor">
+            <a:schemeClr val="tx1"/>
+          </a:fontRef>
+        </p:style>
+      </p:cxnSp>
+      <p:cxnSp>
+        <p:nvCxnSpPr>
+          <p:cNvPr id="7" name="Conector recto 6"/>
+          <p:cNvCxnSpPr/>
+          <p:nvPr/>
+        </p:nvCxnSpPr>
+        <p:spPr>
+          <a:xfrm>
+            <a:off x="1461695" y="2629243"/>
+            <a:ext cx="3912973" cy="0"/>
+          </a:xfrm>
+          <a:prstGeom prst="line">
+            <a:avLst/>
+          </a:prstGeom>
+          <a:effectLst/>
+        </p:spPr>
+        <p:style>
+          <a:lnRef idx="2">
+            <a:schemeClr val="accent1"/>
+          </a:lnRef>
+          <a:fillRef idx="0">
+            <a:schemeClr val="accent1"/>
+          </a:fillRef>
+          <a:effectRef idx="1">
+            <a:schemeClr val="accent1"/>
+          </a:effectRef>
+          <a:fontRef idx="minor">
+            <a:schemeClr val="tx1"/>
+          </a:fontRef>
+        </p:style>
+      </p:cxnSp>
+      <p:cxnSp>
+        <p:nvCxnSpPr>
+          <p:cNvPr id="8" name="Conector recto 7"/>
+          <p:cNvCxnSpPr/>
+          <p:nvPr/>
+        </p:nvCxnSpPr>
+        <p:spPr>
+          <a:xfrm flipV="1">
+            <a:off x="1461696" y="3742724"/>
+            <a:ext cx="6260757" cy="6865"/>
+          </a:xfrm>
+          <a:prstGeom prst="line">
+            <a:avLst/>
+          </a:prstGeom>
+          <a:effectLst/>
+        </p:spPr>
+        <p:style>
+          <a:lnRef idx="2">
+            <a:schemeClr val="accent1"/>
+          </a:lnRef>
+          <a:fillRef idx="0">
+            <a:schemeClr val="accent1"/>
+          </a:fillRef>
+          <a:effectRef idx="1">
+            <a:schemeClr val="accent1"/>
+          </a:effectRef>
+          <a:fontRef idx="minor">
+            <a:schemeClr val="tx1"/>
+          </a:fontRef>
+        </p:style>
+      </p:cxnSp>
+      <p:sp>
+        <p:nvSpPr>
+          <p:cNvPr id="9" name="CuadroTexto 8"/>
+          <p:cNvSpPr txBox="1"/>
+          <p:nvPr/>
+        </p:nvSpPr>
+        <p:spPr>
+          <a:xfrm>
+            <a:off x="0" y="1255753"/>
+            <a:ext cx="1275822" cy="646331"/>
+          </a:xfrm>
+          <a:prstGeom prst="rect">
+            <a:avLst/>
+          </a:prstGeom>
+          <a:noFill/>
+        </p:spPr>
+        <p:txBody>
+          <a:bodyPr wrap="none" rtlCol="0">
+            <a:spAutoFit/>
+          </a:bodyPr>
+          <a:lstStyle/>
+          <a:p>
+            <a:r>
+              <a:rPr lang="es-ES" dirty="0" smtClean="0"/>
+              <a:t>Localidades</a:t>
+            </a:r>
+          </a:p>
+          <a:p>
+            <a:r>
+              <a:rPr lang="es-ES" dirty="0" smtClean="0"/>
+              <a:t>(</a:t>
+            </a:r>
+            <a:r>
+              <a:rPr lang="es-ES" dirty="0" err="1" smtClean="0"/>
+              <a:t>lon,lat</a:t>
+            </a:r>
+            <a:r>
+              <a:rPr lang="es-ES" dirty="0" smtClean="0"/>
+              <a:t>)</a:t>
+            </a:r>
+            <a:endParaRPr lang="es-ES" dirty="0"/>
+          </a:p>
+        </p:txBody>
+      </p:sp>
+      <p:sp>
+        <p:nvSpPr>
+          <p:cNvPr id="10" name="CuadroTexto 9"/>
+          <p:cNvSpPr txBox="1"/>
+          <p:nvPr/>
+        </p:nvSpPr>
+        <p:spPr>
+          <a:xfrm>
+            <a:off x="-85304" y="2325301"/>
+            <a:ext cx="1558840" cy="646331"/>
+          </a:xfrm>
+          <a:prstGeom prst="rect">
+            <a:avLst/>
+          </a:prstGeom>
+          <a:noFill/>
+        </p:spPr>
+        <p:txBody>
+          <a:bodyPr wrap="none" rtlCol="0">
+            <a:spAutoFit/>
+          </a:bodyPr>
+          <a:lstStyle/>
+          <a:p>
+            <a:r>
+              <a:rPr lang="es-ES" dirty="0" smtClean="0"/>
+              <a:t>Recursos</a:t>
+            </a:r>
+          </a:p>
+          <a:p>
+            <a:r>
+              <a:rPr lang="es-ES" dirty="0" smtClean="0"/>
+              <a:t>(</a:t>
+            </a:r>
+            <a:r>
+              <a:rPr lang="es-ES" dirty="0" err="1" smtClean="0"/>
+              <a:t>id_rec,lon,lat</a:t>
+            </a:r>
+            <a:r>
+              <a:rPr lang="es-ES" dirty="0" smtClean="0"/>
+              <a:t>)</a:t>
+            </a:r>
+            <a:endParaRPr lang="es-ES" dirty="0"/>
+          </a:p>
+        </p:txBody>
+      </p:sp>
+      <p:sp>
+        <p:nvSpPr>
+          <p:cNvPr id="11" name="CuadroTexto 10"/>
+          <p:cNvSpPr txBox="1"/>
+          <p:nvPr/>
+        </p:nvSpPr>
+        <p:spPr>
+          <a:xfrm>
+            <a:off x="0" y="3921211"/>
+            <a:ext cx="2339102" cy="646331"/>
+          </a:xfrm>
+          <a:prstGeom prst="rect">
+            <a:avLst/>
+          </a:prstGeom>
+          <a:noFill/>
+        </p:spPr>
+        <p:txBody>
+          <a:bodyPr wrap="none" rtlCol="0">
+            <a:spAutoFit/>
+          </a:bodyPr>
+          <a:lstStyle/>
+          <a:p>
+            <a:r>
+              <a:rPr lang="es-ES" dirty="0" smtClean="0"/>
+              <a:t>Localidades + Recursos</a:t>
+            </a:r>
+          </a:p>
+          <a:p>
+            <a:r>
+              <a:rPr lang="es-ES" dirty="0" smtClean="0"/>
+              <a:t>(</a:t>
+            </a:r>
+            <a:r>
+              <a:rPr lang="es-ES" dirty="0" err="1" smtClean="0"/>
+              <a:t>id_rec,dist</a:t>
+            </a:r>
+            <a:r>
+              <a:rPr lang="es-ES" dirty="0" smtClean="0"/>
+              <a:t>)</a:t>
+            </a:r>
+            <a:endParaRPr lang="es-ES" dirty="0"/>
+          </a:p>
+        </p:txBody>
+      </p:sp>
+      <p:cxnSp>
+        <p:nvCxnSpPr>
+          <p:cNvPr id="13" name="Conector recto de flecha 12"/>
+          <p:cNvCxnSpPr/>
+          <p:nvPr/>
+        </p:nvCxnSpPr>
+        <p:spPr>
+          <a:xfrm>
+            <a:off x="1461696" y="1572054"/>
+            <a:ext cx="854" cy="1399578"/>
+          </a:xfrm>
+          <a:prstGeom prst="straightConnector1">
+            <a:avLst/>
+          </a:prstGeom>
+          <a:ln w="12700">
+            <a:solidFill>
+              <a:schemeClr val="tx1">
+                <a:lumMod val="65000"/>
+                <a:lumOff val="35000"/>
+              </a:schemeClr>
+            </a:solidFill>
+            <a:tailEnd type="triangle"/>
+          </a:ln>
+          <a:effectLst/>
+        </p:spPr>
+        <p:style>
+          <a:lnRef idx="2">
+            <a:schemeClr val="accent1"/>
+          </a:lnRef>
+          <a:fillRef idx="0">
+            <a:schemeClr val="accent1"/>
+          </a:fillRef>
+          <a:effectRef idx="1">
+            <a:schemeClr val="accent1"/>
+          </a:effectRef>
+          <a:fontRef idx="minor">
+            <a:schemeClr val="tx1"/>
+          </a:fontRef>
+        </p:style>
+      </p:cxnSp>
+      <p:cxnSp>
+        <p:nvCxnSpPr>
+          <p:cNvPr id="19" name="Conector recto de flecha 18"/>
+          <p:cNvCxnSpPr/>
+          <p:nvPr/>
+        </p:nvCxnSpPr>
+        <p:spPr>
+          <a:xfrm flipH="1">
+            <a:off x="1462550" y="2629243"/>
+            <a:ext cx="2" cy="1110738"/>
+          </a:xfrm>
+          <a:prstGeom prst="straightConnector1">
+            <a:avLst/>
+          </a:prstGeom>
+          <a:ln w="12700">
+            <a:solidFill>
+              <a:schemeClr val="tx1">
+                <a:lumMod val="65000"/>
+                <a:lumOff val="35000"/>
+              </a:schemeClr>
+            </a:solidFill>
+            <a:tailEnd type="triangle"/>
+          </a:ln>
+          <a:effectLst/>
+        </p:spPr>
+        <p:style>
+          <a:lnRef idx="2">
+            <a:schemeClr val="accent1"/>
+          </a:lnRef>
+          <a:fillRef idx="0">
+            <a:schemeClr val="accent1"/>
+          </a:fillRef>
+          <a:effectRef idx="1">
+            <a:schemeClr val="accent1"/>
+          </a:effectRef>
+          <a:fontRef idx="minor">
+            <a:schemeClr val="tx1"/>
+          </a:fontRef>
+        </p:style>
+      </p:cxnSp>
+      <p:sp>
+        <p:nvSpPr>
+          <p:cNvPr id="21" name="CuadroTexto 20"/>
+          <p:cNvSpPr txBox="1"/>
+          <p:nvPr/>
+        </p:nvSpPr>
+        <p:spPr>
+          <a:xfrm>
+            <a:off x="7908324" y="1387388"/>
+            <a:ext cx="878178" cy="369332"/>
+          </a:xfrm>
+          <a:prstGeom prst="rect">
+            <a:avLst/>
+          </a:prstGeom>
+          <a:noFill/>
+        </p:spPr>
+        <p:txBody>
+          <a:bodyPr wrap="none" rtlCol="0">
+            <a:spAutoFit/>
+          </a:bodyPr>
+          <a:lstStyle/>
+          <a:p>
+            <a:r>
+              <a:rPr lang="es-ES" dirty="0" smtClean="0"/>
+              <a:t>200 mil</a:t>
+            </a:r>
+            <a:endParaRPr lang="es-ES" dirty="0"/>
+          </a:p>
+        </p:txBody>
+      </p:sp>
+      <p:sp>
+        <p:nvSpPr>
+          <p:cNvPr id="22" name="CuadroTexto 21"/>
+          <p:cNvSpPr txBox="1"/>
+          <p:nvPr/>
+        </p:nvSpPr>
+        <p:spPr>
+          <a:xfrm>
+            <a:off x="5701613" y="2444577"/>
+            <a:ext cx="644189" cy="369332"/>
+          </a:xfrm>
+          <a:prstGeom prst="rect">
+            <a:avLst/>
+          </a:prstGeom>
+          <a:noFill/>
+        </p:spPr>
+        <p:txBody>
+          <a:bodyPr wrap="none" rtlCol="0">
+            <a:spAutoFit/>
+          </a:bodyPr>
+          <a:lstStyle/>
+          <a:p>
+            <a:r>
+              <a:rPr lang="es-ES" dirty="0"/>
+              <a:t>7</a:t>
+            </a:r>
+            <a:r>
+              <a:rPr lang="es-ES" dirty="0" smtClean="0"/>
+              <a:t> </a:t>
+            </a:r>
+            <a:r>
+              <a:rPr lang="es-ES" dirty="0" smtClean="0"/>
+              <a:t>mil</a:t>
+            </a:r>
+            <a:endParaRPr lang="es-ES" dirty="0"/>
+          </a:p>
+        </p:txBody>
+      </p:sp>
+      <p:sp>
+        <p:nvSpPr>
+          <p:cNvPr id="24" name="CuadroTexto 23"/>
+          <p:cNvSpPr txBox="1"/>
+          <p:nvPr/>
+        </p:nvSpPr>
+        <p:spPr>
+          <a:xfrm>
+            <a:off x="7971481" y="3564923"/>
+            <a:ext cx="878178" cy="369332"/>
+          </a:xfrm>
+          <a:prstGeom prst="rect">
+            <a:avLst/>
+          </a:prstGeom>
+          <a:noFill/>
+        </p:spPr>
+        <p:txBody>
+          <a:bodyPr wrap="none" rtlCol="0">
+            <a:spAutoFit/>
+          </a:bodyPr>
+          <a:lstStyle/>
+          <a:p>
+            <a:r>
+              <a:rPr lang="es-ES" dirty="0" smtClean="0"/>
+              <a:t>200 mil</a:t>
+            </a:r>
+            <a:endParaRPr lang="es-ES" dirty="0"/>
+          </a:p>
+        </p:txBody>
+      </p:sp>
+      <p:cxnSp>
+        <p:nvCxnSpPr>
+          <p:cNvPr id="20" name="Conector recto de flecha 19"/>
+          <p:cNvCxnSpPr/>
+          <p:nvPr/>
+        </p:nvCxnSpPr>
+        <p:spPr>
+          <a:xfrm>
+            <a:off x="1462550" y="1572054"/>
+            <a:ext cx="356639" cy="1399578"/>
+          </a:xfrm>
+          <a:prstGeom prst="straightConnector1">
+            <a:avLst/>
+          </a:prstGeom>
+          <a:ln w="12700">
+            <a:solidFill>
+              <a:srgbClr val="FF0000"/>
+            </a:solidFill>
+            <a:prstDash val="sysDash"/>
+            <a:tailEnd type="triangle"/>
+          </a:ln>
+          <a:effectLst/>
+        </p:spPr>
+        <p:style>
+          <a:lnRef idx="2">
+            <a:schemeClr val="accent1"/>
+          </a:lnRef>
+          <a:fillRef idx="0">
+            <a:schemeClr val="accent1"/>
+          </a:fillRef>
+          <a:effectRef idx="1">
+            <a:schemeClr val="accent1"/>
+          </a:effectRef>
+          <a:fontRef idx="minor">
+            <a:schemeClr val="tx1"/>
+          </a:fontRef>
+        </p:style>
+      </p:cxnSp>
+      <p:cxnSp>
+        <p:nvCxnSpPr>
+          <p:cNvPr id="27" name="Conector recto de flecha 26"/>
+          <p:cNvCxnSpPr/>
+          <p:nvPr/>
+        </p:nvCxnSpPr>
+        <p:spPr>
+          <a:xfrm flipH="1">
+            <a:off x="1461695" y="2971632"/>
+            <a:ext cx="357494" cy="768349"/>
+          </a:xfrm>
+          <a:prstGeom prst="straightConnector1">
+            <a:avLst/>
+          </a:prstGeom>
+          <a:ln w="12700">
+            <a:solidFill>
+              <a:srgbClr val="FF0000"/>
+            </a:solidFill>
+            <a:prstDash val="sysDash"/>
+            <a:tailEnd type="triangle"/>
+          </a:ln>
+          <a:effectLst/>
+        </p:spPr>
+        <p:style>
+          <a:lnRef idx="2">
+            <a:schemeClr val="accent1"/>
+          </a:lnRef>
+          <a:fillRef idx="0">
+            <a:schemeClr val="accent1"/>
+          </a:fillRef>
+          <a:effectRef idx="1">
+            <a:schemeClr val="accent1"/>
+          </a:effectRef>
+          <a:fontRef idx="minor">
+            <a:schemeClr val="tx1"/>
+          </a:fontRef>
+        </p:style>
+      </p:cxnSp>
+      <p:cxnSp>
+        <p:nvCxnSpPr>
+          <p:cNvPr id="23" name="Conector recto de flecha 22"/>
+          <p:cNvCxnSpPr/>
+          <p:nvPr/>
+        </p:nvCxnSpPr>
+        <p:spPr>
+          <a:xfrm flipH="1">
+            <a:off x="2038865" y="1572054"/>
+            <a:ext cx="2520259" cy="1399578"/>
+          </a:xfrm>
+          <a:prstGeom prst="straightConnector1">
+            <a:avLst/>
+          </a:prstGeom>
+          <a:ln w="12700">
+            <a:solidFill>
+              <a:schemeClr val="tx1">
+                <a:lumMod val="65000"/>
+                <a:lumOff val="35000"/>
+              </a:schemeClr>
+            </a:solidFill>
+            <a:prstDash val="sysDash"/>
+            <a:tailEnd type="triangle"/>
+          </a:ln>
+          <a:effectLst/>
+        </p:spPr>
+        <p:style>
+          <a:lnRef idx="2">
+            <a:schemeClr val="accent1"/>
+          </a:lnRef>
+          <a:fillRef idx="0">
+            <a:schemeClr val="accent1"/>
+          </a:fillRef>
+          <a:effectRef idx="1">
+            <a:schemeClr val="accent1"/>
+          </a:effectRef>
+          <a:fontRef idx="minor">
+            <a:schemeClr val="tx1"/>
+          </a:fontRef>
+        </p:style>
+      </p:cxnSp>
+      <p:cxnSp>
+        <p:nvCxnSpPr>
+          <p:cNvPr id="26" name="Conector recto de flecha 25"/>
+          <p:cNvCxnSpPr/>
+          <p:nvPr/>
+        </p:nvCxnSpPr>
+        <p:spPr>
+          <a:xfrm>
+            <a:off x="2038865" y="2971632"/>
+            <a:ext cx="2465859" cy="768349"/>
+          </a:xfrm>
+          <a:prstGeom prst="straightConnector1">
+            <a:avLst/>
+          </a:prstGeom>
+          <a:ln w="12700">
+            <a:solidFill>
+              <a:schemeClr val="tx1">
+                <a:lumMod val="65000"/>
+                <a:lumOff val="35000"/>
+              </a:schemeClr>
+            </a:solidFill>
+            <a:prstDash val="sysDash"/>
+            <a:tailEnd type="triangle"/>
+          </a:ln>
+          <a:effectLst/>
+        </p:spPr>
+        <p:style>
+          <a:lnRef idx="2">
+            <a:schemeClr val="accent1"/>
+          </a:lnRef>
+          <a:fillRef idx="0">
+            <a:schemeClr val="accent1"/>
+          </a:fillRef>
+          <a:effectRef idx="1">
+            <a:schemeClr val="accent1"/>
+          </a:effectRef>
+          <a:fontRef idx="minor">
+            <a:schemeClr val="tx1"/>
+          </a:fontRef>
+        </p:style>
+      </p:cxnSp>
+      <p:cxnSp>
+        <p:nvCxnSpPr>
+          <p:cNvPr id="28" name="Conector recto 27"/>
+          <p:cNvCxnSpPr/>
+          <p:nvPr/>
+        </p:nvCxnSpPr>
+        <p:spPr>
+          <a:xfrm>
+            <a:off x="1461695" y="2971632"/>
+            <a:ext cx="1632986" cy="0"/>
+          </a:xfrm>
+          <a:prstGeom prst="line">
+            <a:avLst/>
+          </a:prstGeom>
+          <a:effectLst/>
+        </p:spPr>
+        <p:style>
+          <a:lnRef idx="2">
+            <a:schemeClr val="accent1"/>
+          </a:lnRef>
+          <a:fillRef idx="0">
+            <a:schemeClr val="accent1"/>
+          </a:fillRef>
+          <a:effectRef idx="1">
+            <a:schemeClr val="accent1"/>
+          </a:effectRef>
+          <a:fontRef idx="minor">
+            <a:schemeClr val="tx1"/>
+          </a:fontRef>
+        </p:style>
+      </p:cxnSp>
+      <p:cxnSp>
+        <p:nvCxnSpPr>
+          <p:cNvPr id="29" name="Conector recto 28"/>
+          <p:cNvCxnSpPr/>
+          <p:nvPr/>
+        </p:nvCxnSpPr>
+        <p:spPr>
+          <a:xfrm>
+            <a:off x="3094681" y="3227005"/>
+            <a:ext cx="1632986" cy="0"/>
+          </a:xfrm>
+          <a:prstGeom prst="line">
+            <a:avLst/>
+          </a:prstGeom>
+          <a:effectLst/>
+        </p:spPr>
+        <p:style>
+          <a:lnRef idx="2">
+            <a:schemeClr val="accent1"/>
+          </a:lnRef>
+          <a:fillRef idx="0">
+            <a:schemeClr val="accent1"/>
+          </a:fillRef>
+          <a:effectRef idx="1">
+            <a:schemeClr val="accent1"/>
+          </a:effectRef>
+          <a:fontRef idx="minor">
+            <a:schemeClr val="tx1"/>
+          </a:fontRef>
+        </p:style>
+      </p:cxnSp>
+      <p:cxnSp>
+        <p:nvCxnSpPr>
+          <p:cNvPr id="30" name="Conector recto 29"/>
+          <p:cNvCxnSpPr/>
+          <p:nvPr/>
+        </p:nvCxnSpPr>
+        <p:spPr>
+          <a:xfrm>
+            <a:off x="4727667" y="3460410"/>
+            <a:ext cx="647001" cy="0"/>
+          </a:xfrm>
+          <a:prstGeom prst="line">
+            <a:avLst/>
+          </a:prstGeom>
+          <a:effectLst/>
+        </p:spPr>
+        <p:style>
+          <a:lnRef idx="2">
+            <a:schemeClr val="accent1"/>
+          </a:lnRef>
+          <a:fillRef idx="0">
+            <a:schemeClr val="accent1"/>
+          </a:fillRef>
+          <a:effectRef idx="1">
+            <a:schemeClr val="accent1"/>
+          </a:effectRef>
+          <a:fontRef idx="minor">
+            <a:schemeClr val="tx1"/>
+          </a:fontRef>
+        </p:style>
+      </p:cxnSp>
+      <p:sp>
+        <p:nvSpPr>
+          <p:cNvPr id="31" name="CuadroTexto 30"/>
+          <p:cNvSpPr txBox="1"/>
+          <p:nvPr/>
+        </p:nvSpPr>
+        <p:spPr>
+          <a:xfrm>
+            <a:off x="2379164" y="2710022"/>
+            <a:ext cx="715517" cy="261610"/>
+          </a:xfrm>
+          <a:prstGeom prst="rect">
+            <a:avLst/>
+          </a:prstGeom>
+          <a:noFill/>
+        </p:spPr>
+        <p:txBody>
+          <a:bodyPr wrap="none" rtlCol="0">
+            <a:spAutoFit/>
+          </a:bodyPr>
+          <a:lstStyle/>
+          <a:p>
+            <a:r>
+              <a:rPr lang="es-ES" sz="1100" dirty="0" smtClean="0"/>
+              <a:t>1er copia</a:t>
+            </a:r>
+            <a:endParaRPr lang="es-ES" sz="1100" dirty="0"/>
+          </a:p>
+        </p:txBody>
+      </p:sp>
+      <p:sp>
+        <p:nvSpPr>
+          <p:cNvPr id="32" name="CuadroTexto 31"/>
+          <p:cNvSpPr txBox="1"/>
+          <p:nvPr/>
+        </p:nvSpPr>
+        <p:spPr>
+          <a:xfrm>
+            <a:off x="3976453" y="2965395"/>
+            <a:ext cx="813043" cy="261610"/>
+          </a:xfrm>
+          <a:prstGeom prst="rect">
+            <a:avLst/>
+          </a:prstGeom>
+          <a:noFill/>
+        </p:spPr>
+        <p:txBody>
+          <a:bodyPr wrap="none" rtlCol="0">
+            <a:spAutoFit/>
+          </a:bodyPr>
+          <a:lstStyle/>
+          <a:p>
+            <a:r>
+              <a:rPr lang="es-ES" sz="1100" dirty="0" smtClean="0"/>
+              <a:t>2nda copia</a:t>
+            </a:r>
+            <a:endParaRPr lang="es-ES" sz="1100" dirty="0"/>
+          </a:p>
+        </p:txBody>
+      </p:sp>
+      <p:cxnSp>
+        <p:nvCxnSpPr>
+          <p:cNvPr id="33" name="Conector recto de flecha 32"/>
+          <p:cNvCxnSpPr/>
+          <p:nvPr/>
+        </p:nvCxnSpPr>
+        <p:spPr>
+          <a:xfrm>
+            <a:off x="1462550" y="1572054"/>
+            <a:ext cx="2244477" cy="1654951"/>
+          </a:xfrm>
+          <a:prstGeom prst="straightConnector1">
+            <a:avLst/>
+          </a:prstGeom>
+          <a:ln w="12700">
+            <a:solidFill>
+              <a:srgbClr val="FF0000"/>
+            </a:solidFill>
+            <a:prstDash val="sysDash"/>
+            <a:tailEnd type="triangle"/>
+          </a:ln>
+          <a:effectLst/>
+        </p:spPr>
+        <p:style>
+          <a:lnRef idx="2">
+            <a:schemeClr val="accent1"/>
+          </a:lnRef>
+          <a:fillRef idx="0">
+            <a:schemeClr val="accent1"/>
+          </a:fillRef>
+          <a:effectRef idx="1">
+            <a:schemeClr val="accent1"/>
+          </a:effectRef>
+          <a:fontRef idx="minor">
+            <a:schemeClr val="tx1"/>
+          </a:fontRef>
+        </p:style>
+      </p:cxnSp>
+      <p:cxnSp>
+        <p:nvCxnSpPr>
+          <p:cNvPr id="36" name="Conector recto de flecha 35"/>
+          <p:cNvCxnSpPr/>
+          <p:nvPr/>
+        </p:nvCxnSpPr>
+        <p:spPr>
+          <a:xfrm flipH="1">
+            <a:off x="1473537" y="3227005"/>
+            <a:ext cx="2233490" cy="522584"/>
+          </a:xfrm>
+          <a:prstGeom prst="straightConnector1">
+            <a:avLst/>
+          </a:prstGeom>
+          <a:ln w="12700">
+            <a:solidFill>
+              <a:srgbClr val="FF0000"/>
+            </a:solidFill>
+            <a:prstDash val="sysDash"/>
+            <a:tailEnd type="triangle"/>
+          </a:ln>
+          <a:effectLst/>
+        </p:spPr>
+        <p:style>
+          <a:lnRef idx="2">
+            <a:schemeClr val="accent1"/>
+          </a:lnRef>
+          <a:fillRef idx="0">
+            <a:schemeClr val="accent1"/>
+          </a:fillRef>
+          <a:effectRef idx="1">
+            <a:schemeClr val="accent1"/>
+          </a:effectRef>
+          <a:fontRef idx="minor">
+            <a:schemeClr val="tx1"/>
+          </a:fontRef>
+        </p:style>
+      </p:cxnSp>
+      <p:sp>
+        <p:nvSpPr>
+          <p:cNvPr id="39" name="CuadroTexto 38"/>
+          <p:cNvSpPr txBox="1"/>
+          <p:nvPr/>
+        </p:nvSpPr>
+        <p:spPr>
+          <a:xfrm>
+            <a:off x="5699433" y="3198800"/>
+            <a:ext cx="715517" cy="261610"/>
+          </a:xfrm>
+          <a:prstGeom prst="rect">
+            <a:avLst/>
+          </a:prstGeom>
+          <a:noFill/>
+        </p:spPr>
+        <p:txBody>
+          <a:bodyPr wrap="none" rtlCol="0">
+            <a:spAutoFit/>
+          </a:bodyPr>
+          <a:lstStyle/>
+          <a:p>
+            <a:r>
+              <a:rPr lang="es-ES" sz="1100" dirty="0" smtClean="0"/>
+              <a:t>3er copia</a:t>
+            </a:r>
+            <a:endParaRPr lang="es-ES" sz="1100" dirty="0"/>
+          </a:p>
+        </p:txBody>
+      </p:sp>
+      <p:cxnSp>
+        <p:nvCxnSpPr>
+          <p:cNvPr id="40" name="Conector recto de flecha 39"/>
+          <p:cNvCxnSpPr/>
+          <p:nvPr/>
+        </p:nvCxnSpPr>
+        <p:spPr>
+          <a:xfrm>
+            <a:off x="1473536" y="1572054"/>
+            <a:ext cx="3839869" cy="1888356"/>
+          </a:xfrm>
+          <a:prstGeom prst="straightConnector1">
+            <a:avLst/>
+          </a:prstGeom>
+          <a:ln w="12700">
+            <a:solidFill>
+              <a:srgbClr val="FF0000"/>
+            </a:solidFill>
+            <a:prstDash val="sysDash"/>
+            <a:tailEnd type="triangle"/>
+          </a:ln>
+          <a:effectLst/>
+        </p:spPr>
+        <p:style>
+          <a:lnRef idx="2">
+            <a:schemeClr val="accent1"/>
+          </a:lnRef>
+          <a:fillRef idx="0">
+            <a:schemeClr val="accent1"/>
+          </a:fillRef>
+          <a:effectRef idx="1">
+            <a:schemeClr val="accent1"/>
+          </a:effectRef>
+          <a:fontRef idx="minor">
+            <a:schemeClr val="tx1"/>
+          </a:fontRef>
+        </p:style>
+      </p:cxnSp>
+      <p:cxnSp>
+        <p:nvCxnSpPr>
+          <p:cNvPr id="43" name="Conector recto de flecha 42"/>
+          <p:cNvCxnSpPr/>
+          <p:nvPr/>
+        </p:nvCxnSpPr>
+        <p:spPr>
+          <a:xfrm flipH="1">
+            <a:off x="1473537" y="3460410"/>
+            <a:ext cx="3839868" cy="289179"/>
+          </a:xfrm>
+          <a:prstGeom prst="straightConnector1">
+            <a:avLst/>
+          </a:prstGeom>
+          <a:ln w="12700">
+            <a:solidFill>
+              <a:srgbClr val="FF0000"/>
+            </a:solidFill>
+            <a:prstDash val="sysDash"/>
+            <a:tailEnd type="triangle"/>
+          </a:ln>
+          <a:effectLst/>
+        </p:spPr>
+        <p:style>
+          <a:lnRef idx="2">
+            <a:schemeClr val="accent1"/>
+          </a:lnRef>
+          <a:fillRef idx="0">
+            <a:schemeClr val="accent1"/>
+          </a:fillRef>
+          <a:effectRef idx="1">
+            <a:schemeClr val="accent1"/>
+          </a:effectRef>
+          <a:fontRef idx="minor">
+            <a:schemeClr val="tx1"/>
+          </a:fontRef>
+        </p:style>
+      </p:cxnSp>
+    </p:spTree>
+    <p:extLst>
+      <p:ext uri="{BB962C8B-B14F-4D97-AF65-F5344CB8AC3E}">
+        <p14:creationId xmlns:p14="http://schemas.microsoft.com/office/powerpoint/2010/main" val="3966225954"/>
+      </p:ext>
+    </p:extLst>
+  </p:cSld>
+  <p:clrMapOvr>
+    <a:masterClrMapping/>
+  </p:clrMapOvr>
+</p:sld>
+</file>
+
+<file path=ppt/slides/slide6.xml><?xml version="1.0" encoding="utf-8"?>
+<p:sld xmlns:a="http://schemas.openxmlformats.org/drawingml/2006/main" xmlns:r="http://schemas.openxmlformats.org/officeDocument/2006/relationships" xmlns:p="http://schemas.openxmlformats.org/presentationml/2006/main">
+  <p:cSld>
+    <p:spTree>
+      <p:nvGrpSpPr>
+        <p:cNvPr id="1" name=""/>
+        <p:cNvGrpSpPr/>
+        <p:nvPr/>
+      </p:nvGrpSpPr>
+      <p:grpSpPr>
+        <a:xfrm>
+          <a:off x="0" y="0"/>
+          <a:ext cx="0" cy="0"/>
+          <a:chOff x="0" y="0"/>
+          <a:chExt cx="0" cy="0"/>
+        </a:xfrm>
+      </p:grpSpPr>
+      <p:sp>
+        <p:nvSpPr>
+          <p:cNvPr id="2" name="Título 1"/>
+          <p:cNvSpPr>
+            <a:spLocks noGrp="1"/>
+          </p:cNvSpPr>
+          <p:nvPr>
+            <p:ph type="title"/>
+          </p:nvPr>
+        </p:nvSpPr>
+        <p:spPr/>
+        <p:txBody>
+          <a:bodyPr/>
+          <a:lstStyle/>
+          <a:p>
+            <a:pPr algn="l"/>
+            <a:r>
+              <a:rPr lang="es-ES" dirty="0" err="1" smtClean="0"/>
+              <a:t>Shared</a:t>
+            </a:r>
+            <a:r>
+              <a:rPr lang="es-ES" dirty="0" smtClean="0"/>
+              <a:t> </a:t>
+            </a:r>
+            <a:r>
+              <a:rPr lang="es-ES" dirty="0" err="1" smtClean="0"/>
+              <a:t>Memory</a:t>
+            </a:r>
+            <a:endParaRPr lang="es-ES" dirty="0"/>
+          </a:p>
+        </p:txBody>
+      </p:sp>
+      <p:cxnSp>
+        <p:nvCxnSpPr>
+          <p:cNvPr id="7" name="Conector recto 6"/>
+          <p:cNvCxnSpPr/>
+          <p:nvPr/>
+        </p:nvCxnSpPr>
+        <p:spPr>
+          <a:xfrm>
+            <a:off x="1461695" y="2629243"/>
+            <a:ext cx="3912973" cy="0"/>
+          </a:xfrm>
+          <a:prstGeom prst="line">
+            <a:avLst/>
+          </a:prstGeom>
+          <a:effectLst/>
+        </p:spPr>
+        <p:style>
+          <a:lnRef idx="2">
+            <a:schemeClr val="accent1"/>
+          </a:lnRef>
+          <a:fillRef idx="0">
+            <a:schemeClr val="accent1"/>
+          </a:fillRef>
+          <a:effectRef idx="1">
+            <a:schemeClr val="accent1"/>
+          </a:effectRef>
+          <a:fontRef idx="minor">
+            <a:schemeClr val="tx1"/>
+          </a:fontRef>
+        </p:style>
+      </p:cxnSp>
+      <p:sp>
+        <p:nvSpPr>
+          <p:cNvPr id="10" name="CuadroTexto 9"/>
+          <p:cNvSpPr txBox="1"/>
+          <p:nvPr/>
+        </p:nvSpPr>
+        <p:spPr>
+          <a:xfrm>
+            <a:off x="-85304" y="2325301"/>
+            <a:ext cx="1558840" cy="646331"/>
+          </a:xfrm>
+          <a:prstGeom prst="rect">
+            <a:avLst/>
+          </a:prstGeom>
+          <a:noFill/>
+        </p:spPr>
+        <p:txBody>
+          <a:bodyPr wrap="none" rtlCol="0">
+            <a:spAutoFit/>
+          </a:bodyPr>
+          <a:lstStyle/>
+          <a:p>
+            <a:r>
+              <a:rPr lang="es-ES" dirty="0" smtClean="0"/>
+              <a:t>Recursos</a:t>
+            </a:r>
+          </a:p>
+          <a:p>
+            <a:r>
+              <a:rPr lang="es-ES" dirty="0" smtClean="0"/>
+              <a:t>(</a:t>
+            </a:r>
+            <a:r>
+              <a:rPr lang="es-ES" dirty="0" err="1" smtClean="0"/>
+              <a:t>id_rec,lon,lat</a:t>
+            </a:r>
+            <a:r>
+              <a:rPr lang="es-ES" dirty="0" smtClean="0"/>
+              <a:t>)</a:t>
+            </a:r>
+            <a:endParaRPr lang="es-ES" dirty="0"/>
+          </a:p>
+        </p:txBody>
+      </p:sp>
+      <p:cxnSp>
+        <p:nvCxnSpPr>
+          <p:cNvPr id="28" name="Conector recto 27"/>
+          <p:cNvCxnSpPr/>
+          <p:nvPr/>
+        </p:nvCxnSpPr>
+        <p:spPr>
+          <a:xfrm>
+            <a:off x="1461695" y="2971632"/>
+            <a:ext cx="1632986" cy="0"/>
+          </a:xfrm>
+          <a:prstGeom prst="line">
+            <a:avLst/>
+          </a:prstGeom>
+          <a:effectLst/>
+        </p:spPr>
+        <p:style>
+          <a:lnRef idx="2">
+            <a:schemeClr val="accent1"/>
+          </a:lnRef>
+          <a:fillRef idx="0">
+            <a:schemeClr val="accent1"/>
+          </a:fillRef>
+          <a:effectRef idx="1">
+            <a:schemeClr val="accent1"/>
+          </a:effectRef>
+          <a:fontRef idx="minor">
+            <a:schemeClr val="tx1"/>
+          </a:fontRef>
+        </p:style>
+      </p:cxnSp>
+      <p:cxnSp>
+        <p:nvCxnSpPr>
+          <p:cNvPr id="29" name="Conector recto 28"/>
+          <p:cNvCxnSpPr/>
+          <p:nvPr/>
+        </p:nvCxnSpPr>
+        <p:spPr>
+          <a:xfrm>
+            <a:off x="3094681" y="3556525"/>
+            <a:ext cx="1632986" cy="0"/>
+          </a:xfrm>
+          <a:prstGeom prst="line">
+            <a:avLst/>
+          </a:prstGeom>
+          <a:effectLst/>
+        </p:spPr>
+        <p:style>
+          <a:lnRef idx="2">
+            <a:schemeClr val="accent1"/>
+          </a:lnRef>
+          <a:fillRef idx="0">
+            <a:schemeClr val="accent1"/>
+          </a:fillRef>
+          <a:effectRef idx="1">
+            <a:schemeClr val="accent1"/>
+          </a:effectRef>
+          <a:fontRef idx="minor">
+            <a:schemeClr val="tx1"/>
+          </a:fontRef>
+        </p:style>
+      </p:cxnSp>
+      <p:cxnSp>
+        <p:nvCxnSpPr>
+          <p:cNvPr id="30" name="Conector recto 29"/>
+          <p:cNvCxnSpPr/>
+          <p:nvPr/>
+        </p:nvCxnSpPr>
+        <p:spPr>
+          <a:xfrm>
+            <a:off x="4727667" y="3975274"/>
+            <a:ext cx="647001" cy="0"/>
+          </a:xfrm>
+          <a:prstGeom prst="line">
+            <a:avLst/>
+          </a:prstGeom>
+          <a:effectLst/>
+        </p:spPr>
+        <p:style>
+          <a:lnRef idx="2">
+            <a:schemeClr val="accent1"/>
+          </a:lnRef>
+          <a:fillRef idx="0">
+            <a:schemeClr val="accent1"/>
+          </a:fillRef>
+          <a:effectRef idx="1">
+            <a:schemeClr val="accent1"/>
+          </a:effectRef>
+          <a:fontRef idx="minor">
+            <a:schemeClr val="tx1"/>
+          </a:fontRef>
+        </p:style>
+      </p:cxnSp>
+      <p:sp>
+        <p:nvSpPr>
+          <p:cNvPr id="31" name="CuadroTexto 30"/>
+          <p:cNvSpPr txBox="1"/>
+          <p:nvPr/>
+        </p:nvSpPr>
+        <p:spPr>
+          <a:xfrm>
+            <a:off x="2379164" y="2710022"/>
+            <a:ext cx="715517" cy="261610"/>
+          </a:xfrm>
+          <a:prstGeom prst="rect">
+            <a:avLst/>
+          </a:prstGeom>
+          <a:noFill/>
+        </p:spPr>
+        <p:txBody>
+          <a:bodyPr wrap="none" rtlCol="0">
+            <a:spAutoFit/>
+          </a:bodyPr>
+          <a:lstStyle/>
+          <a:p>
+            <a:r>
+              <a:rPr lang="es-ES" sz="1100" dirty="0" smtClean="0"/>
+              <a:t>1er copia</a:t>
+            </a:r>
+            <a:endParaRPr lang="es-ES" sz="1100" dirty="0"/>
+          </a:p>
+        </p:txBody>
+      </p:sp>
+      <p:sp>
+        <p:nvSpPr>
+          <p:cNvPr id="32" name="CuadroTexto 31"/>
+          <p:cNvSpPr txBox="1"/>
+          <p:nvPr/>
+        </p:nvSpPr>
+        <p:spPr>
+          <a:xfrm>
+            <a:off x="3976453" y="3294915"/>
+            <a:ext cx="813043" cy="261610"/>
+          </a:xfrm>
+          <a:prstGeom prst="rect">
+            <a:avLst/>
+          </a:prstGeom>
+          <a:noFill/>
+        </p:spPr>
+        <p:txBody>
+          <a:bodyPr wrap="none" rtlCol="0">
+            <a:spAutoFit/>
+          </a:bodyPr>
+          <a:lstStyle/>
+          <a:p>
+            <a:r>
+              <a:rPr lang="es-ES" sz="1100" dirty="0" smtClean="0"/>
+              <a:t>2nda copia</a:t>
+            </a:r>
+            <a:endParaRPr lang="es-ES" sz="1100" dirty="0"/>
+          </a:p>
+        </p:txBody>
+      </p:sp>
+      <p:sp>
+        <p:nvSpPr>
+          <p:cNvPr id="39" name="CuadroTexto 38"/>
+          <p:cNvSpPr txBox="1"/>
+          <p:nvPr/>
+        </p:nvSpPr>
+        <p:spPr>
+          <a:xfrm>
+            <a:off x="4789496" y="3706572"/>
+            <a:ext cx="715517" cy="261610"/>
+          </a:xfrm>
+          <a:prstGeom prst="rect">
+            <a:avLst/>
+          </a:prstGeom>
+          <a:noFill/>
+        </p:spPr>
+        <p:txBody>
+          <a:bodyPr wrap="none" rtlCol="0">
+            <a:spAutoFit/>
+          </a:bodyPr>
+          <a:lstStyle/>
+          <a:p>
+            <a:r>
+              <a:rPr lang="es-ES" sz="1100" dirty="0" smtClean="0"/>
+              <a:t>3er copia</a:t>
+            </a:r>
+            <a:endParaRPr lang="es-ES" sz="1100" dirty="0"/>
+          </a:p>
+        </p:txBody>
+      </p:sp>
+    </p:spTree>
+    <p:extLst>
+      <p:ext uri="{BB962C8B-B14F-4D97-AF65-F5344CB8AC3E}">
+        <p14:creationId xmlns:p14="http://schemas.microsoft.com/office/powerpoint/2010/main" val="4199585637"/>
+      </p:ext>
+    </p:extLst>
+  </p:cSld>
+  <p:clrMapOvr>
+    <a:masterClrMapping/>
+  </p:clrMapOvr>
+</p:sld>
+</file>
+
+<file path=ppt/slides/slide7.xml><?xml version="1.0" encoding="utf-8"?>
 <p:sld xmlns:a="http://schemas.openxmlformats.org/drawingml/2006/main" xmlns:r="http://schemas.openxmlformats.org/officeDocument/2006/relationships" xmlns:p="http://schemas.openxmlformats.org/presentationml/2006/main">
   <p:cSld>
     <p:spTree>

</xml_diff>

<commit_message>
Continua la depuración otro esquema para la memoria
Se implementa una version mas limitada de uso de memoria o una version
mas conservadora
</commit_message>
<xml_diff>
--- a/docs/ModeloCUDA.pptx
+++ b/docs/ModeloCUDA.pptx
@@ -11,7 +11,8 @@
     <p:sldId id="260" r:id="rId5"/>
     <p:sldId id="261" r:id="rId6"/>
     <p:sldId id="262" r:id="rId7"/>
-    <p:sldId id="259" r:id="rId8"/>
+    <p:sldId id="263" r:id="rId8"/>
+    <p:sldId id="259" r:id="rId9"/>
   </p:sldIdLst>
   <p:sldSz cx="9144000" cy="5143500" type="screen16x9"/>
   <p:notesSz cx="6858000" cy="9144000"/>
@@ -294,7 +295,7 @@
           <a:p>
             <a:fld id="{8B1ED8BD-6781-8745-973E-8C949FE6FDC7}" type="datetimeFigureOut">
               <a:rPr lang="es-ES" smtClean="0"/>
-              <a:t>13/09/14</a:t>
+              <a:t>15/09/14</a:t>
             </a:fld>
             <a:endParaRPr lang="es-ES"/>
           </a:p>
@@ -464,7 +465,7 @@
           <a:p>
             <a:fld id="{8B1ED8BD-6781-8745-973E-8C949FE6FDC7}" type="datetimeFigureOut">
               <a:rPr lang="es-ES" smtClean="0"/>
-              <a:t>13/09/14</a:t>
+              <a:t>15/09/14</a:t>
             </a:fld>
             <a:endParaRPr lang="es-ES"/>
           </a:p>
@@ -644,7 +645,7 @@
           <a:p>
             <a:fld id="{8B1ED8BD-6781-8745-973E-8C949FE6FDC7}" type="datetimeFigureOut">
               <a:rPr lang="es-ES" smtClean="0"/>
-              <a:t>13/09/14</a:t>
+              <a:t>15/09/14</a:t>
             </a:fld>
             <a:endParaRPr lang="es-ES"/>
           </a:p>
@@ -814,7 +815,7 @@
           <a:p>
             <a:fld id="{8B1ED8BD-6781-8745-973E-8C949FE6FDC7}" type="datetimeFigureOut">
               <a:rPr lang="es-ES" smtClean="0"/>
-              <a:t>13/09/14</a:t>
+              <a:t>15/09/14</a:t>
             </a:fld>
             <a:endParaRPr lang="es-ES"/>
           </a:p>
@@ -1060,7 +1061,7 @@
           <a:p>
             <a:fld id="{8B1ED8BD-6781-8745-973E-8C949FE6FDC7}" type="datetimeFigureOut">
               <a:rPr lang="es-ES" smtClean="0"/>
-              <a:t>13/09/14</a:t>
+              <a:t>15/09/14</a:t>
             </a:fld>
             <a:endParaRPr lang="es-ES"/>
           </a:p>
@@ -1348,7 +1349,7 @@
           <a:p>
             <a:fld id="{8B1ED8BD-6781-8745-973E-8C949FE6FDC7}" type="datetimeFigureOut">
               <a:rPr lang="es-ES" smtClean="0"/>
-              <a:t>13/09/14</a:t>
+              <a:t>15/09/14</a:t>
             </a:fld>
             <a:endParaRPr lang="es-ES"/>
           </a:p>
@@ -1770,7 +1771,7 @@
           <a:p>
             <a:fld id="{8B1ED8BD-6781-8745-973E-8C949FE6FDC7}" type="datetimeFigureOut">
               <a:rPr lang="es-ES" smtClean="0"/>
-              <a:t>13/09/14</a:t>
+              <a:t>15/09/14</a:t>
             </a:fld>
             <a:endParaRPr lang="es-ES"/>
           </a:p>
@@ -1888,7 +1889,7 @@
           <a:p>
             <a:fld id="{8B1ED8BD-6781-8745-973E-8C949FE6FDC7}" type="datetimeFigureOut">
               <a:rPr lang="es-ES" smtClean="0"/>
-              <a:t>13/09/14</a:t>
+              <a:t>15/09/14</a:t>
             </a:fld>
             <a:endParaRPr lang="es-ES"/>
           </a:p>
@@ -1983,7 +1984,7 @@
           <a:p>
             <a:fld id="{8B1ED8BD-6781-8745-973E-8C949FE6FDC7}" type="datetimeFigureOut">
               <a:rPr lang="es-ES" smtClean="0"/>
-              <a:t>13/09/14</a:t>
+              <a:t>15/09/14</a:t>
             </a:fld>
             <a:endParaRPr lang="es-ES"/>
           </a:p>
@@ -2260,7 +2261,7 @@
           <a:p>
             <a:fld id="{8B1ED8BD-6781-8745-973E-8C949FE6FDC7}" type="datetimeFigureOut">
               <a:rPr lang="es-ES" smtClean="0"/>
-              <a:t>13/09/14</a:t>
+              <a:t>15/09/14</a:t>
             </a:fld>
             <a:endParaRPr lang="es-ES"/>
           </a:p>
@@ -2513,7 +2514,7 @@
           <a:p>
             <a:fld id="{8B1ED8BD-6781-8745-973E-8C949FE6FDC7}" type="datetimeFigureOut">
               <a:rPr lang="es-ES" smtClean="0"/>
-              <a:t>13/09/14</a:t>
+              <a:t>15/09/14</a:t>
             </a:fld>
             <a:endParaRPr lang="es-ES"/>
           </a:p>
@@ -2726,7 +2727,7 @@
           <a:p>
             <a:fld id="{8B1ED8BD-6781-8745-973E-8C949FE6FDC7}" type="datetimeFigureOut">
               <a:rPr lang="es-ES" smtClean="0"/>
-              <a:t>13/09/14</a:t>
+              <a:t>15/09/14</a:t>
             </a:fld>
             <a:endParaRPr lang="es-ES"/>
           </a:p>
@@ -5482,11 +5483,7 @@
             </a:r>
             <a:r>
               <a:rPr lang="es-ES" dirty="0" smtClean="0"/>
-              <a:t> </a:t>
-            </a:r>
-            <a:r>
-              <a:rPr lang="es-ES" dirty="0" smtClean="0"/>
-              <a:t>mil</a:t>
+              <a:t> mil</a:t>
             </a:r>
             <a:endParaRPr lang="es-ES" dirty="0"/>
           </a:p>
@@ -6349,6 +6346,428 @@
 </file>
 
 <file path=ppt/slides/slide7.xml><?xml version="1.0" encoding="utf-8"?>
+<p:sld xmlns:a="http://schemas.openxmlformats.org/drawingml/2006/main" xmlns:r="http://schemas.openxmlformats.org/officeDocument/2006/relationships" xmlns:p="http://schemas.openxmlformats.org/presentationml/2006/main">
+  <p:cSld>
+    <p:spTree>
+      <p:nvGrpSpPr>
+        <p:cNvPr id="1" name=""/>
+        <p:cNvGrpSpPr/>
+        <p:nvPr/>
+      </p:nvGrpSpPr>
+      <p:grpSpPr>
+        <a:xfrm>
+          <a:off x="0" y="0"/>
+          <a:ext cx="0" cy="0"/>
+          <a:chOff x="0" y="0"/>
+          <a:chExt cx="0" cy="0"/>
+        </a:xfrm>
+      </p:grpSpPr>
+      <p:sp>
+        <p:nvSpPr>
+          <p:cNvPr id="2" name="Título 1"/>
+          <p:cNvSpPr>
+            <a:spLocks noGrp="1"/>
+          </p:cNvSpPr>
+          <p:nvPr>
+            <p:ph type="title"/>
+          </p:nvPr>
+        </p:nvSpPr>
+        <p:spPr/>
+        <p:txBody>
+          <a:bodyPr>
+            <a:noAutofit/>
+          </a:bodyPr>
+          <a:lstStyle/>
+          <a:p>
+            <a:pPr algn="l"/>
+            <a:r>
+              <a:rPr lang="es-ES" sz="3200" dirty="0" err="1" smtClean="0"/>
+              <a:t>Shared</a:t>
+            </a:r>
+            <a:r>
+              <a:rPr lang="es-ES" sz="3200" dirty="0" smtClean="0"/>
+              <a:t> </a:t>
+            </a:r>
+            <a:r>
+              <a:rPr lang="es-ES" sz="3200" dirty="0" err="1" smtClean="0"/>
+              <a:t>Memory</a:t>
+            </a:r>
+            <a:r>
+              <a:rPr lang="es-ES" sz="3200" dirty="0" smtClean="0"/>
+              <a:t> (una sola copia  </a:t>
+            </a:r>
+            <a:r>
+              <a:rPr lang="es-ES" sz="3200" dirty="0" err="1" smtClean="0"/>
+              <a:t>multiples</a:t>
+            </a:r>
+            <a:r>
+              <a:rPr lang="es-ES" sz="3200" dirty="0" smtClean="0"/>
+              <a:t> invocaciones)</a:t>
+            </a:r>
+            <a:endParaRPr lang="es-ES" sz="3200" dirty="0"/>
+          </a:p>
+        </p:txBody>
+      </p:sp>
+      <p:sp>
+        <p:nvSpPr>
+          <p:cNvPr id="10" name="CuadroTexto 9"/>
+          <p:cNvSpPr txBox="1"/>
+          <p:nvPr/>
+        </p:nvSpPr>
+        <p:spPr>
+          <a:xfrm>
+            <a:off x="-85304" y="2325301"/>
+            <a:ext cx="1558840" cy="646331"/>
+          </a:xfrm>
+          <a:prstGeom prst="rect">
+            <a:avLst/>
+          </a:prstGeom>
+          <a:noFill/>
+        </p:spPr>
+        <p:txBody>
+          <a:bodyPr wrap="none" rtlCol="0">
+            <a:spAutoFit/>
+          </a:bodyPr>
+          <a:lstStyle/>
+          <a:p>
+            <a:r>
+              <a:rPr lang="es-ES" dirty="0" smtClean="0"/>
+              <a:t>Recursos</a:t>
+            </a:r>
+          </a:p>
+          <a:p>
+            <a:r>
+              <a:rPr lang="es-ES" dirty="0" smtClean="0"/>
+              <a:t>(</a:t>
+            </a:r>
+            <a:r>
+              <a:rPr lang="es-ES" dirty="0" err="1" smtClean="0"/>
+              <a:t>id_rec,lon,lat</a:t>
+            </a:r>
+            <a:r>
+              <a:rPr lang="es-ES" dirty="0" smtClean="0"/>
+              <a:t>)</a:t>
+            </a:r>
+            <a:endParaRPr lang="es-ES" dirty="0"/>
+          </a:p>
+        </p:txBody>
+      </p:sp>
+      <p:cxnSp>
+        <p:nvCxnSpPr>
+          <p:cNvPr id="28" name="Conector recto 27"/>
+          <p:cNvCxnSpPr/>
+          <p:nvPr/>
+        </p:nvCxnSpPr>
+        <p:spPr>
+          <a:xfrm>
+            <a:off x="1461695" y="2971632"/>
+            <a:ext cx="1632986" cy="0"/>
+          </a:xfrm>
+          <a:prstGeom prst="line">
+            <a:avLst/>
+          </a:prstGeom>
+          <a:effectLst/>
+        </p:spPr>
+        <p:style>
+          <a:lnRef idx="2">
+            <a:schemeClr val="accent1"/>
+          </a:lnRef>
+          <a:fillRef idx="0">
+            <a:schemeClr val="accent1"/>
+          </a:fillRef>
+          <a:effectRef idx="1">
+            <a:schemeClr val="accent1"/>
+          </a:effectRef>
+          <a:fontRef idx="minor">
+            <a:schemeClr val="tx1"/>
+          </a:fontRef>
+        </p:style>
+      </p:cxnSp>
+      <p:sp>
+        <p:nvSpPr>
+          <p:cNvPr id="31" name="CuadroTexto 30"/>
+          <p:cNvSpPr txBox="1"/>
+          <p:nvPr/>
+        </p:nvSpPr>
+        <p:spPr>
+          <a:xfrm>
+            <a:off x="2379164" y="2710022"/>
+            <a:ext cx="715517" cy="261610"/>
+          </a:xfrm>
+          <a:prstGeom prst="rect">
+            <a:avLst/>
+          </a:prstGeom>
+          <a:noFill/>
+        </p:spPr>
+        <p:txBody>
+          <a:bodyPr wrap="none" rtlCol="0">
+            <a:spAutoFit/>
+          </a:bodyPr>
+          <a:lstStyle/>
+          <a:p>
+            <a:r>
+              <a:rPr lang="es-ES" sz="1100" dirty="0" smtClean="0"/>
+              <a:t>1er copia</a:t>
+            </a:r>
+            <a:endParaRPr lang="es-ES" sz="1100" dirty="0"/>
+          </a:p>
+        </p:txBody>
+      </p:sp>
+      <p:cxnSp>
+        <p:nvCxnSpPr>
+          <p:cNvPr id="11" name="Conector recto 10"/>
+          <p:cNvCxnSpPr/>
+          <p:nvPr/>
+        </p:nvCxnSpPr>
+        <p:spPr>
+          <a:xfrm>
+            <a:off x="1461695" y="1936410"/>
+            <a:ext cx="1632986" cy="0"/>
+          </a:xfrm>
+          <a:prstGeom prst="line">
+            <a:avLst/>
+          </a:prstGeom>
+          <a:effectLst/>
+        </p:spPr>
+        <p:style>
+          <a:lnRef idx="2">
+            <a:schemeClr val="accent1"/>
+          </a:lnRef>
+          <a:fillRef idx="0">
+            <a:schemeClr val="accent1"/>
+          </a:fillRef>
+          <a:effectRef idx="1">
+            <a:schemeClr val="accent1"/>
+          </a:effectRef>
+          <a:fontRef idx="minor">
+            <a:schemeClr val="tx1"/>
+          </a:fontRef>
+        </p:style>
+      </p:cxnSp>
+      <p:sp>
+        <p:nvSpPr>
+          <p:cNvPr id="3" name="CuadroTexto 2"/>
+          <p:cNvSpPr txBox="1"/>
+          <p:nvPr/>
+        </p:nvSpPr>
+        <p:spPr>
+          <a:xfrm>
+            <a:off x="3253946" y="1751744"/>
+            <a:ext cx="1633781" cy="369332"/>
+          </a:xfrm>
+          <a:prstGeom prst="rect">
+            <a:avLst/>
+          </a:prstGeom>
+          <a:noFill/>
+        </p:spPr>
+        <p:txBody>
+          <a:bodyPr wrap="none" rtlCol="0">
+            <a:spAutoFit/>
+          </a:bodyPr>
+          <a:lstStyle/>
+          <a:p>
+            <a:r>
+              <a:rPr lang="es-ES" dirty="0" smtClean="0"/>
+              <a:t>Global </a:t>
+            </a:r>
+            <a:r>
+              <a:rPr lang="es-ES" dirty="0" err="1" smtClean="0"/>
+              <a:t>memory</a:t>
+            </a:r>
+            <a:endParaRPr lang="es-ES" dirty="0"/>
+          </a:p>
+        </p:txBody>
+      </p:sp>
+      <p:sp>
+        <p:nvSpPr>
+          <p:cNvPr id="13" name="CuadroTexto 12"/>
+          <p:cNvSpPr txBox="1"/>
+          <p:nvPr/>
+        </p:nvSpPr>
+        <p:spPr>
+          <a:xfrm>
+            <a:off x="3351427" y="2786966"/>
+            <a:ext cx="1665916" cy="369332"/>
+          </a:xfrm>
+          <a:prstGeom prst="rect">
+            <a:avLst/>
+          </a:prstGeom>
+          <a:noFill/>
+        </p:spPr>
+        <p:txBody>
+          <a:bodyPr wrap="none" rtlCol="0">
+            <a:spAutoFit/>
+          </a:bodyPr>
+          <a:lstStyle/>
+          <a:p>
+            <a:r>
+              <a:rPr lang="es-ES" dirty="0" err="1" smtClean="0"/>
+              <a:t>shared</a:t>
+            </a:r>
+            <a:r>
+              <a:rPr lang="es-ES" dirty="0" smtClean="0"/>
+              <a:t> </a:t>
+            </a:r>
+            <a:r>
+              <a:rPr lang="es-ES" dirty="0" err="1" smtClean="0"/>
+              <a:t>memory</a:t>
+            </a:r>
+            <a:endParaRPr lang="es-ES" dirty="0"/>
+          </a:p>
+        </p:txBody>
+      </p:sp>
+      <p:cxnSp>
+        <p:nvCxnSpPr>
+          <p:cNvPr id="14" name="Conector recto 13"/>
+          <p:cNvCxnSpPr/>
+          <p:nvPr/>
+        </p:nvCxnSpPr>
+        <p:spPr>
+          <a:xfrm flipV="1">
+            <a:off x="1461695" y="1572054"/>
+            <a:ext cx="6260757" cy="6865"/>
+          </a:xfrm>
+          <a:prstGeom prst="line">
+            <a:avLst/>
+          </a:prstGeom>
+          <a:effectLst/>
+        </p:spPr>
+        <p:style>
+          <a:lnRef idx="2">
+            <a:schemeClr val="accent1"/>
+          </a:lnRef>
+          <a:fillRef idx="0">
+            <a:schemeClr val="accent1"/>
+          </a:fillRef>
+          <a:effectRef idx="1">
+            <a:schemeClr val="accent1"/>
+          </a:effectRef>
+          <a:fontRef idx="minor">
+            <a:schemeClr val="tx1"/>
+          </a:fontRef>
+        </p:style>
+      </p:cxnSp>
+      <p:cxnSp>
+        <p:nvCxnSpPr>
+          <p:cNvPr id="15" name="Conector recto 14"/>
+          <p:cNvCxnSpPr/>
+          <p:nvPr/>
+        </p:nvCxnSpPr>
+        <p:spPr>
+          <a:xfrm flipV="1">
+            <a:off x="1461695" y="3739981"/>
+            <a:ext cx="6260757" cy="6865"/>
+          </a:xfrm>
+          <a:prstGeom prst="line">
+            <a:avLst/>
+          </a:prstGeom>
+          <a:effectLst/>
+        </p:spPr>
+        <p:style>
+          <a:lnRef idx="2">
+            <a:schemeClr val="accent1"/>
+          </a:lnRef>
+          <a:fillRef idx="0">
+            <a:schemeClr val="accent1"/>
+          </a:fillRef>
+          <a:effectRef idx="1">
+            <a:schemeClr val="accent1"/>
+          </a:effectRef>
+          <a:fontRef idx="minor">
+            <a:schemeClr val="tx1"/>
+          </a:fontRef>
+        </p:style>
+      </p:cxnSp>
+      <p:cxnSp>
+        <p:nvCxnSpPr>
+          <p:cNvPr id="16" name="Conector recto de flecha 15"/>
+          <p:cNvCxnSpPr/>
+          <p:nvPr/>
+        </p:nvCxnSpPr>
+        <p:spPr>
+          <a:xfrm>
+            <a:off x="1462550" y="1572054"/>
+            <a:ext cx="356639" cy="1399578"/>
+          </a:xfrm>
+          <a:prstGeom prst="straightConnector1">
+            <a:avLst/>
+          </a:prstGeom>
+          <a:ln w="12700">
+            <a:solidFill>
+              <a:srgbClr val="FF0000"/>
+            </a:solidFill>
+            <a:prstDash val="sysDash"/>
+            <a:tailEnd type="triangle"/>
+          </a:ln>
+          <a:effectLst/>
+        </p:spPr>
+        <p:style>
+          <a:lnRef idx="2">
+            <a:schemeClr val="accent1"/>
+          </a:lnRef>
+          <a:fillRef idx="0">
+            <a:schemeClr val="accent1"/>
+          </a:fillRef>
+          <a:effectRef idx="1">
+            <a:schemeClr val="accent1"/>
+          </a:effectRef>
+          <a:fontRef idx="minor">
+            <a:schemeClr val="tx1"/>
+          </a:fontRef>
+        </p:style>
+      </p:cxnSp>
+      <p:cxnSp>
+        <p:nvCxnSpPr>
+          <p:cNvPr id="17" name="Conector recto de flecha 16"/>
+          <p:cNvCxnSpPr/>
+          <p:nvPr/>
+        </p:nvCxnSpPr>
+        <p:spPr>
+          <a:xfrm flipH="1">
+            <a:off x="1461695" y="2971632"/>
+            <a:ext cx="357494" cy="768349"/>
+          </a:xfrm>
+          <a:prstGeom prst="straightConnector1">
+            <a:avLst/>
+          </a:prstGeom>
+          <a:ln w="12700">
+            <a:solidFill>
+              <a:srgbClr val="FF0000"/>
+            </a:solidFill>
+            <a:prstDash val="sysDash"/>
+            <a:tailEnd type="triangle"/>
+          </a:ln>
+          <a:effectLst/>
+        </p:spPr>
+        <p:style>
+          <a:lnRef idx="2">
+            <a:schemeClr val="accent1"/>
+          </a:lnRef>
+          <a:fillRef idx="0">
+            <a:schemeClr val="accent1"/>
+          </a:fillRef>
+          <a:effectRef idx="1">
+            <a:schemeClr val="accent1"/>
+          </a:effectRef>
+          <a:fontRef idx="minor">
+            <a:schemeClr val="tx1"/>
+          </a:fontRef>
+        </p:style>
+      </p:cxnSp>
+    </p:spTree>
+    <p:extLst>
+      <p:ext uri="{BB962C8B-B14F-4D97-AF65-F5344CB8AC3E}">
+        <p14:creationId xmlns:p14="http://schemas.microsoft.com/office/powerpoint/2010/main" val="4041854128"/>
+      </p:ext>
+    </p:extLst>
+  </p:cSld>
+  <p:clrMapOvr>
+    <a:masterClrMapping/>
+  </p:clrMapOvr>
+</p:sld>
+</file>
+
+<file path=ppt/slides/slide8.xml><?xml version="1.0" encoding="utf-8"?>
 <p:sld xmlns:a="http://schemas.openxmlformats.org/drawingml/2006/main" xmlns:r="http://schemas.openxmlformats.org/officeDocument/2006/relationships" xmlns:p="http://schemas.openxmlformats.org/presentationml/2006/main">
   <p:cSld>
     <p:spTree>

</xml_diff>